<commit_message>
Reviewed (Mar 6, 2023)
</commit_message>
<xml_diff>
--- a/Figures/Figures.pptx
+++ b/Figures/Figures.pptx
@@ -4,11 +4,17 @@
   <p:sldMasterIdLst>
     <p:sldMasterId id="2147483648" r:id="rId1"/>
   </p:sldMasterIdLst>
+  <p:notesMasterIdLst>
+    <p:notesMasterId r:id="rId9"/>
+  </p:notesMasterIdLst>
   <p:sldIdLst>
     <p:sldId id="256" r:id="rId2"/>
     <p:sldId id="257" r:id="rId3"/>
     <p:sldId id="258" r:id="rId4"/>
     <p:sldId id="260" r:id="rId5"/>
+    <p:sldId id="261" r:id="rId6"/>
+    <p:sldId id="262" r:id="rId7"/>
+    <p:sldId id="263" r:id="rId8"/>
   </p:sldIdLst>
   <p:sldSz cx="12192000" cy="6858000"/>
   <p:notesSz cx="6858000" cy="9144000"/>
@@ -115,6 +121,439 @@
 </p:presentation>
 </file>
 
+<file path=ppt/notesMasters/notesMaster1.xml><?xml version="1.0" encoding="utf-8"?>
+<p:notesMaster xmlns:a="http://schemas.openxmlformats.org/drawingml/2006/main" xmlns:r="http://schemas.openxmlformats.org/officeDocument/2006/relationships" xmlns:p="http://schemas.openxmlformats.org/presentationml/2006/main">
+  <p:cSld>
+    <p:bg>
+      <p:bgRef idx="1001">
+        <a:schemeClr val="bg1"/>
+      </p:bgRef>
+    </p:bg>
+    <p:spTree>
+      <p:nvGrpSpPr>
+        <p:cNvPr id="1" name=""/>
+        <p:cNvGrpSpPr/>
+        <p:nvPr/>
+      </p:nvGrpSpPr>
+      <p:grpSpPr>
+        <a:xfrm>
+          <a:off x="0" y="0"/>
+          <a:ext cx="0" cy="0"/>
+          <a:chOff x="0" y="0"/>
+          <a:chExt cx="0" cy="0"/>
+        </a:xfrm>
+      </p:grpSpPr>
+      <p:sp>
+        <p:nvSpPr>
+          <p:cNvPr id="2" name="Header Placeholder 1"/>
+          <p:cNvSpPr>
+            <a:spLocks noGrp="1"/>
+          </p:cNvSpPr>
+          <p:nvPr>
+            <p:ph type="hdr" sz="quarter"/>
+          </p:nvPr>
+        </p:nvSpPr>
+        <p:spPr>
+          <a:xfrm>
+            <a:off x="0" y="0"/>
+            <a:ext cx="2971800" cy="458788"/>
+          </a:xfrm>
+          <a:prstGeom prst="rect">
+            <a:avLst/>
+          </a:prstGeom>
+        </p:spPr>
+        <p:txBody>
+          <a:bodyPr vert="horz" lIns="91440" tIns="45720" rIns="91440" bIns="45720" rtlCol="0"/>
+          <a:lstStyle>
+            <a:lvl1pPr algn="l">
+              <a:defRPr sz="1200"/>
+            </a:lvl1pPr>
+          </a:lstStyle>
+          <a:p>
+            <a:endParaRPr lang="en-US"/>
+          </a:p>
+        </p:txBody>
+      </p:sp>
+      <p:sp>
+        <p:nvSpPr>
+          <p:cNvPr id="3" name="Date Placeholder 2"/>
+          <p:cNvSpPr>
+            <a:spLocks noGrp="1"/>
+          </p:cNvSpPr>
+          <p:nvPr>
+            <p:ph type="dt" idx="1"/>
+          </p:nvPr>
+        </p:nvSpPr>
+        <p:spPr>
+          <a:xfrm>
+            <a:off x="3884613" y="0"/>
+            <a:ext cx="2971800" cy="458788"/>
+          </a:xfrm>
+          <a:prstGeom prst="rect">
+            <a:avLst/>
+          </a:prstGeom>
+        </p:spPr>
+        <p:txBody>
+          <a:bodyPr vert="horz" lIns="91440" tIns="45720" rIns="91440" bIns="45720" rtlCol="0"/>
+          <a:lstStyle>
+            <a:lvl1pPr algn="r">
+              <a:defRPr sz="1200"/>
+            </a:lvl1pPr>
+          </a:lstStyle>
+          <a:p>
+            <a:fld id="{8032393F-6002-4A0D-980D-CD58D0F70141}" type="datetimeFigureOut">
+              <a:rPr lang="en-US" smtClean="0"/>
+              <a:t>2/24/2023</a:t>
+            </a:fld>
+            <a:endParaRPr lang="en-US"/>
+          </a:p>
+        </p:txBody>
+      </p:sp>
+      <p:sp>
+        <p:nvSpPr>
+          <p:cNvPr id="4" name="Slide Image Placeholder 3"/>
+          <p:cNvSpPr>
+            <a:spLocks noGrp="1" noRot="1" noChangeAspect="1"/>
+          </p:cNvSpPr>
+          <p:nvPr>
+            <p:ph type="sldImg" idx="2"/>
+          </p:nvPr>
+        </p:nvSpPr>
+        <p:spPr>
+          <a:xfrm>
+            <a:off x="685800" y="1143000"/>
+            <a:ext cx="5486400" cy="3086100"/>
+          </a:xfrm>
+          <a:prstGeom prst="rect">
+            <a:avLst/>
+          </a:prstGeom>
+          <a:noFill/>
+          <a:ln w="12700">
+            <a:solidFill>
+              <a:prstClr val="black"/>
+            </a:solidFill>
+          </a:ln>
+        </p:spPr>
+        <p:txBody>
+          <a:bodyPr vert="horz" lIns="91440" tIns="45720" rIns="91440" bIns="45720" rtlCol="0" anchor="ctr"/>
+          <a:lstStyle/>
+          <a:p>
+            <a:endParaRPr lang="en-US"/>
+          </a:p>
+        </p:txBody>
+      </p:sp>
+      <p:sp>
+        <p:nvSpPr>
+          <p:cNvPr id="5" name="Notes Placeholder 4"/>
+          <p:cNvSpPr>
+            <a:spLocks noGrp="1"/>
+          </p:cNvSpPr>
+          <p:nvPr>
+            <p:ph type="body" sz="quarter" idx="3"/>
+          </p:nvPr>
+        </p:nvSpPr>
+        <p:spPr>
+          <a:xfrm>
+            <a:off x="685800" y="4400550"/>
+            <a:ext cx="5486400" cy="3600450"/>
+          </a:xfrm>
+          <a:prstGeom prst="rect">
+            <a:avLst/>
+          </a:prstGeom>
+        </p:spPr>
+        <p:txBody>
+          <a:bodyPr vert="horz" lIns="91440" tIns="45720" rIns="91440" bIns="45720" rtlCol="0"/>
+          <a:lstStyle/>
+          <a:p>
+            <a:pPr lvl="0"/>
+            <a:r>
+              <a:rPr lang="en-US"/>
+              <a:t>Click to edit Master text styles</a:t>
+            </a:r>
+          </a:p>
+          <a:p>
+            <a:pPr lvl="1"/>
+            <a:r>
+              <a:rPr lang="en-US"/>
+              <a:t>Second level</a:t>
+            </a:r>
+          </a:p>
+          <a:p>
+            <a:pPr lvl="2"/>
+            <a:r>
+              <a:rPr lang="en-US"/>
+              <a:t>Third level</a:t>
+            </a:r>
+          </a:p>
+          <a:p>
+            <a:pPr lvl="3"/>
+            <a:r>
+              <a:rPr lang="en-US"/>
+              <a:t>Fourth level</a:t>
+            </a:r>
+          </a:p>
+          <a:p>
+            <a:pPr lvl="4"/>
+            <a:r>
+              <a:rPr lang="en-US"/>
+              <a:t>Fifth level</a:t>
+            </a:r>
+          </a:p>
+        </p:txBody>
+      </p:sp>
+      <p:sp>
+        <p:nvSpPr>
+          <p:cNvPr id="6" name="Footer Placeholder 5"/>
+          <p:cNvSpPr>
+            <a:spLocks noGrp="1"/>
+          </p:cNvSpPr>
+          <p:nvPr>
+            <p:ph type="ftr" sz="quarter" idx="4"/>
+          </p:nvPr>
+        </p:nvSpPr>
+        <p:spPr>
+          <a:xfrm>
+            <a:off x="0" y="8685213"/>
+            <a:ext cx="2971800" cy="458787"/>
+          </a:xfrm>
+          <a:prstGeom prst="rect">
+            <a:avLst/>
+          </a:prstGeom>
+        </p:spPr>
+        <p:txBody>
+          <a:bodyPr vert="horz" lIns="91440" tIns="45720" rIns="91440" bIns="45720" rtlCol="0" anchor="b"/>
+          <a:lstStyle>
+            <a:lvl1pPr algn="l">
+              <a:defRPr sz="1200"/>
+            </a:lvl1pPr>
+          </a:lstStyle>
+          <a:p>
+            <a:endParaRPr lang="en-US"/>
+          </a:p>
+        </p:txBody>
+      </p:sp>
+      <p:sp>
+        <p:nvSpPr>
+          <p:cNvPr id="7" name="Slide Number Placeholder 6"/>
+          <p:cNvSpPr>
+            <a:spLocks noGrp="1"/>
+          </p:cNvSpPr>
+          <p:nvPr>
+            <p:ph type="sldNum" sz="quarter" idx="5"/>
+          </p:nvPr>
+        </p:nvSpPr>
+        <p:spPr>
+          <a:xfrm>
+            <a:off x="3884613" y="8685213"/>
+            <a:ext cx="2971800" cy="458787"/>
+          </a:xfrm>
+          <a:prstGeom prst="rect">
+            <a:avLst/>
+          </a:prstGeom>
+        </p:spPr>
+        <p:txBody>
+          <a:bodyPr vert="horz" lIns="91440" tIns="45720" rIns="91440" bIns="45720" rtlCol="0" anchor="b"/>
+          <a:lstStyle>
+            <a:lvl1pPr algn="r">
+              <a:defRPr sz="1200"/>
+            </a:lvl1pPr>
+          </a:lstStyle>
+          <a:p>
+            <a:fld id="{6B6A3D48-009F-4A90-9B7E-B633A1C64267}" type="slidenum">
+              <a:rPr lang="en-US" smtClean="0"/>
+              <a:t>‹#›</a:t>
+            </a:fld>
+            <a:endParaRPr lang="en-US"/>
+          </a:p>
+        </p:txBody>
+      </p:sp>
+    </p:spTree>
+    <p:extLst>
+      <p:ext uri="{BB962C8B-B14F-4D97-AF65-F5344CB8AC3E}">
+        <p14:creationId xmlns:p14="http://schemas.microsoft.com/office/powerpoint/2010/main" val="1002412178"/>
+      </p:ext>
+    </p:extLst>
+  </p:cSld>
+  <p:clrMap bg1="lt1" tx1="dk1" bg2="lt2" tx2="dk2" accent1="accent1" accent2="accent2" accent3="accent3" accent4="accent4" accent5="accent5" accent6="accent6" hlink="hlink" folHlink="folHlink"/>
+  <p:notesStyle>
+    <a:lvl1pPr marL="0" algn="l" defTabSz="914400" rtl="0" eaLnBrk="1" latinLnBrk="0" hangingPunct="1">
+      <a:defRPr sz="1200" kern="1200">
+        <a:solidFill>
+          <a:schemeClr val="tx1"/>
+        </a:solidFill>
+        <a:latin typeface="+mn-lt"/>
+        <a:ea typeface="+mn-ea"/>
+        <a:cs typeface="+mn-cs"/>
+      </a:defRPr>
+    </a:lvl1pPr>
+    <a:lvl2pPr marL="457200" algn="l" defTabSz="914400" rtl="0" eaLnBrk="1" latinLnBrk="0" hangingPunct="1">
+      <a:defRPr sz="1200" kern="1200">
+        <a:solidFill>
+          <a:schemeClr val="tx1"/>
+        </a:solidFill>
+        <a:latin typeface="+mn-lt"/>
+        <a:ea typeface="+mn-ea"/>
+        <a:cs typeface="+mn-cs"/>
+      </a:defRPr>
+    </a:lvl2pPr>
+    <a:lvl3pPr marL="914400" algn="l" defTabSz="914400" rtl="0" eaLnBrk="1" latinLnBrk="0" hangingPunct="1">
+      <a:defRPr sz="1200" kern="1200">
+        <a:solidFill>
+          <a:schemeClr val="tx1"/>
+        </a:solidFill>
+        <a:latin typeface="+mn-lt"/>
+        <a:ea typeface="+mn-ea"/>
+        <a:cs typeface="+mn-cs"/>
+      </a:defRPr>
+    </a:lvl3pPr>
+    <a:lvl4pPr marL="1371600" algn="l" defTabSz="914400" rtl="0" eaLnBrk="1" latinLnBrk="0" hangingPunct="1">
+      <a:defRPr sz="1200" kern="1200">
+        <a:solidFill>
+          <a:schemeClr val="tx1"/>
+        </a:solidFill>
+        <a:latin typeface="+mn-lt"/>
+        <a:ea typeface="+mn-ea"/>
+        <a:cs typeface="+mn-cs"/>
+      </a:defRPr>
+    </a:lvl4pPr>
+    <a:lvl5pPr marL="1828800" algn="l" defTabSz="914400" rtl="0" eaLnBrk="1" latinLnBrk="0" hangingPunct="1">
+      <a:defRPr sz="1200" kern="1200">
+        <a:solidFill>
+          <a:schemeClr val="tx1"/>
+        </a:solidFill>
+        <a:latin typeface="+mn-lt"/>
+        <a:ea typeface="+mn-ea"/>
+        <a:cs typeface="+mn-cs"/>
+      </a:defRPr>
+    </a:lvl5pPr>
+    <a:lvl6pPr marL="2286000" algn="l" defTabSz="914400" rtl="0" eaLnBrk="1" latinLnBrk="0" hangingPunct="1">
+      <a:defRPr sz="1200" kern="1200">
+        <a:solidFill>
+          <a:schemeClr val="tx1"/>
+        </a:solidFill>
+        <a:latin typeface="+mn-lt"/>
+        <a:ea typeface="+mn-ea"/>
+        <a:cs typeface="+mn-cs"/>
+      </a:defRPr>
+    </a:lvl6pPr>
+    <a:lvl7pPr marL="2743200" algn="l" defTabSz="914400" rtl="0" eaLnBrk="1" latinLnBrk="0" hangingPunct="1">
+      <a:defRPr sz="1200" kern="1200">
+        <a:solidFill>
+          <a:schemeClr val="tx1"/>
+        </a:solidFill>
+        <a:latin typeface="+mn-lt"/>
+        <a:ea typeface="+mn-ea"/>
+        <a:cs typeface="+mn-cs"/>
+      </a:defRPr>
+    </a:lvl7pPr>
+    <a:lvl8pPr marL="3200400" algn="l" defTabSz="914400" rtl="0" eaLnBrk="1" latinLnBrk="0" hangingPunct="1">
+      <a:defRPr sz="1200" kern="1200">
+        <a:solidFill>
+          <a:schemeClr val="tx1"/>
+        </a:solidFill>
+        <a:latin typeface="+mn-lt"/>
+        <a:ea typeface="+mn-ea"/>
+        <a:cs typeface="+mn-cs"/>
+      </a:defRPr>
+    </a:lvl8pPr>
+    <a:lvl9pPr marL="3657600" algn="l" defTabSz="914400" rtl="0" eaLnBrk="1" latinLnBrk="0" hangingPunct="1">
+      <a:defRPr sz="1200" kern="1200">
+        <a:solidFill>
+          <a:schemeClr val="tx1"/>
+        </a:solidFill>
+        <a:latin typeface="+mn-lt"/>
+        <a:ea typeface="+mn-ea"/>
+        <a:cs typeface="+mn-cs"/>
+      </a:defRPr>
+    </a:lvl9pPr>
+  </p:notesStyle>
+</p:notesMaster>
+</file>
+
+<file path=ppt/notesSlides/notesSlide1.xml><?xml version="1.0" encoding="utf-8"?>
+<p:notes xmlns:a="http://schemas.openxmlformats.org/drawingml/2006/main" xmlns:r="http://schemas.openxmlformats.org/officeDocument/2006/relationships" xmlns:p="http://schemas.openxmlformats.org/presentationml/2006/main">
+  <p:cSld>
+    <p:spTree>
+      <p:nvGrpSpPr>
+        <p:cNvPr id="1" name=""/>
+        <p:cNvGrpSpPr/>
+        <p:nvPr/>
+      </p:nvGrpSpPr>
+      <p:grpSpPr>
+        <a:xfrm>
+          <a:off x="0" y="0"/>
+          <a:ext cx="0" cy="0"/>
+          <a:chOff x="0" y="0"/>
+          <a:chExt cx="0" cy="0"/>
+        </a:xfrm>
+      </p:grpSpPr>
+      <p:sp>
+        <p:nvSpPr>
+          <p:cNvPr id="2" name="Slide Image Placeholder 1"/>
+          <p:cNvSpPr>
+            <a:spLocks noGrp="1" noRot="1" noChangeAspect="1"/>
+          </p:cNvSpPr>
+          <p:nvPr>
+            <p:ph type="sldImg"/>
+          </p:nvPr>
+        </p:nvSpPr>
+        <p:spPr/>
+      </p:sp>
+      <p:sp>
+        <p:nvSpPr>
+          <p:cNvPr id="3" name="Notes Placeholder 2"/>
+          <p:cNvSpPr>
+            <a:spLocks noGrp="1"/>
+          </p:cNvSpPr>
+          <p:nvPr>
+            <p:ph type="body" idx="1"/>
+          </p:nvPr>
+        </p:nvSpPr>
+        <p:spPr/>
+        <p:txBody>
+          <a:bodyPr/>
+          <a:lstStyle/>
+          <a:p>
+            <a:endParaRPr lang="en-US" dirty="0"/>
+          </a:p>
+        </p:txBody>
+      </p:sp>
+      <p:sp>
+        <p:nvSpPr>
+          <p:cNvPr id="4" name="Slide Number Placeholder 3"/>
+          <p:cNvSpPr>
+            <a:spLocks noGrp="1"/>
+          </p:cNvSpPr>
+          <p:nvPr>
+            <p:ph type="sldNum" sz="quarter" idx="5"/>
+          </p:nvPr>
+        </p:nvSpPr>
+        <p:spPr/>
+        <p:txBody>
+          <a:bodyPr/>
+          <a:lstStyle/>
+          <a:p>
+            <a:fld id="{6B6A3D48-009F-4A90-9B7E-B633A1C64267}" type="slidenum">
+              <a:rPr lang="en-US" smtClean="0"/>
+              <a:t>1</a:t>
+            </a:fld>
+            <a:endParaRPr lang="en-US"/>
+          </a:p>
+        </p:txBody>
+      </p:sp>
+    </p:spTree>
+    <p:extLst>
+      <p:ext uri="{BB962C8B-B14F-4D97-AF65-F5344CB8AC3E}">
+        <p14:creationId xmlns:p14="http://schemas.microsoft.com/office/powerpoint/2010/main" val="1493463067"/>
+      </p:ext>
+    </p:extLst>
+  </p:cSld>
+  <p:clrMapOvr>
+    <a:masterClrMapping/>
+  </p:clrMapOvr>
+</p:notes>
+</file>
+
 <file path=ppt/slideLayouts/slideLayout1.xml><?xml version="1.0" encoding="utf-8"?>
 <p:sldLayout xmlns:a="http://schemas.openxmlformats.org/drawingml/2006/main" xmlns:r="http://schemas.openxmlformats.org/officeDocument/2006/relationships" xmlns:p="http://schemas.openxmlformats.org/presentationml/2006/main" type="title" preserve="1">
   <p:cSld name="Title Slide">
@@ -262,7 +701,7 @@
           <a:p>
             <a:fld id="{CABF7033-26CA-48F8-9B86-6F1148EDA95A}" type="datetimeFigureOut">
               <a:rPr lang="en-US" smtClean="0"/>
-              <a:t>12/7/2022</a:t>
+              <a:t>2/24/2023</a:t>
             </a:fld>
             <a:endParaRPr lang="en-US"/>
           </a:p>
@@ -460,7 +899,7 @@
           <a:p>
             <a:fld id="{CABF7033-26CA-48F8-9B86-6F1148EDA95A}" type="datetimeFigureOut">
               <a:rPr lang="en-US" smtClean="0"/>
-              <a:t>12/7/2022</a:t>
+              <a:t>2/24/2023</a:t>
             </a:fld>
             <a:endParaRPr lang="en-US"/>
           </a:p>
@@ -668,7 +1107,7 @@
           <a:p>
             <a:fld id="{CABF7033-26CA-48F8-9B86-6F1148EDA95A}" type="datetimeFigureOut">
               <a:rPr lang="en-US" smtClean="0"/>
-              <a:t>12/7/2022</a:t>
+              <a:t>2/24/2023</a:t>
             </a:fld>
             <a:endParaRPr lang="en-US"/>
           </a:p>
@@ -866,7 +1305,7 @@
           <a:p>
             <a:fld id="{CABF7033-26CA-48F8-9B86-6F1148EDA95A}" type="datetimeFigureOut">
               <a:rPr lang="en-US" smtClean="0"/>
-              <a:t>12/7/2022</a:t>
+              <a:t>2/24/2023</a:t>
             </a:fld>
             <a:endParaRPr lang="en-US"/>
           </a:p>
@@ -1141,7 +1580,7 @@
           <a:p>
             <a:fld id="{CABF7033-26CA-48F8-9B86-6F1148EDA95A}" type="datetimeFigureOut">
               <a:rPr lang="en-US" smtClean="0"/>
-              <a:t>12/7/2022</a:t>
+              <a:t>2/24/2023</a:t>
             </a:fld>
             <a:endParaRPr lang="en-US"/>
           </a:p>
@@ -1406,7 +1845,7 @@
           <a:p>
             <a:fld id="{CABF7033-26CA-48F8-9B86-6F1148EDA95A}" type="datetimeFigureOut">
               <a:rPr lang="en-US" smtClean="0"/>
-              <a:t>12/7/2022</a:t>
+              <a:t>2/24/2023</a:t>
             </a:fld>
             <a:endParaRPr lang="en-US"/>
           </a:p>
@@ -1818,7 +2257,7 @@
           <a:p>
             <a:fld id="{CABF7033-26CA-48F8-9B86-6F1148EDA95A}" type="datetimeFigureOut">
               <a:rPr lang="en-US" smtClean="0"/>
-              <a:t>12/7/2022</a:t>
+              <a:t>2/24/2023</a:t>
             </a:fld>
             <a:endParaRPr lang="en-US"/>
           </a:p>
@@ -1959,7 +2398,7 @@
           <a:p>
             <a:fld id="{CABF7033-26CA-48F8-9B86-6F1148EDA95A}" type="datetimeFigureOut">
               <a:rPr lang="en-US" smtClean="0"/>
-              <a:t>12/7/2022</a:t>
+              <a:t>2/24/2023</a:t>
             </a:fld>
             <a:endParaRPr lang="en-US"/>
           </a:p>
@@ -2072,7 +2511,7 @@
           <a:p>
             <a:fld id="{CABF7033-26CA-48F8-9B86-6F1148EDA95A}" type="datetimeFigureOut">
               <a:rPr lang="en-US" smtClean="0"/>
-              <a:t>12/7/2022</a:t>
+              <a:t>2/24/2023</a:t>
             </a:fld>
             <a:endParaRPr lang="en-US"/>
           </a:p>
@@ -2383,7 +2822,7 @@
           <a:p>
             <a:fld id="{CABF7033-26CA-48F8-9B86-6F1148EDA95A}" type="datetimeFigureOut">
               <a:rPr lang="en-US" smtClean="0"/>
-              <a:t>12/7/2022</a:t>
+              <a:t>2/24/2023</a:t>
             </a:fld>
             <a:endParaRPr lang="en-US"/>
           </a:p>
@@ -2671,7 +3110,7 @@
           <a:p>
             <a:fld id="{CABF7033-26CA-48F8-9B86-6F1148EDA95A}" type="datetimeFigureOut">
               <a:rPr lang="en-US" smtClean="0"/>
-              <a:t>12/7/2022</a:t>
+              <a:t>2/24/2023</a:t>
             </a:fld>
             <a:endParaRPr lang="en-US"/>
           </a:p>
@@ -2912,7 +3351,7 @@
           <a:p>
             <a:fld id="{CABF7033-26CA-48F8-9B86-6F1148EDA95A}" type="datetimeFigureOut">
               <a:rPr lang="en-US" smtClean="0"/>
-              <a:t>12/7/2022</a:t>
+              <a:t>2/24/2023</a:t>
             </a:fld>
             <a:endParaRPr lang="en-US"/>
           </a:p>
@@ -3344,7 +3783,7 @@
           <p:nvPr/>
         </p:nvPicPr>
         <p:blipFill>
-          <a:blip r:embed="rId2">
+          <a:blip r:embed="rId3">
             <a:extLst>
               <a:ext uri="{28A0092B-C50C-407E-A947-70E740481C1C}">
                 <a14:useLocalDpi xmlns:a14="http://schemas.microsoft.com/office/drawing/2010/main" val="0"/>
@@ -3371,42 +3810,6 @@
             <a:extLst>
               <a:ext uri="{FF2B5EF4-FFF2-40B4-BE49-F238E27FC236}">
                 <a16:creationId xmlns:a16="http://schemas.microsoft.com/office/drawing/2014/main" id="{61932484-7923-A831-DE96-D5D8E2FA3CDC}"/>
-              </a:ext>
-            </a:extLst>
-          </p:cNvPr>
-          <p:cNvPicPr>
-            <a:picLocks noChangeAspect="1"/>
-          </p:cNvPicPr>
-          <p:nvPr/>
-        </p:nvPicPr>
-        <p:blipFill>
-          <a:blip r:embed="rId3">
-            <a:extLst>
-              <a:ext uri="{28A0092B-C50C-407E-A947-70E740481C1C}">
-                <a14:useLocalDpi xmlns:a14="http://schemas.microsoft.com/office/drawing/2010/main" val="0"/>
-              </a:ext>
-            </a:extLst>
-          </a:blip>
-          <a:stretch>
-            <a:fillRect/>
-          </a:stretch>
-        </p:blipFill>
-        <p:spPr>
-          <a:xfrm>
-            <a:off x="4787272" y="3298371"/>
-            <a:ext cx="6998590" cy="3253890"/>
-          </a:xfrm>
-          <a:prstGeom prst="rect">
-            <a:avLst/>
-          </a:prstGeom>
-        </p:spPr>
-      </p:pic>
-      <p:pic>
-        <p:nvPicPr>
-          <p:cNvPr id="13" name="Picture 12" descr="Chart, scatter chart&#10;&#10;Description automatically generated">
-            <a:extLst>
-              <a:ext uri="{FF2B5EF4-FFF2-40B4-BE49-F238E27FC236}">
-                <a16:creationId xmlns:a16="http://schemas.microsoft.com/office/drawing/2014/main" id="{2CA25674-2267-AE07-DBD6-70BA8626D113}"/>
               </a:ext>
             </a:extLst>
           </p:cNvPr>
@@ -3429,8 +3832,8 @@
         </p:blipFill>
         <p:spPr>
           <a:xfrm>
-            <a:off x="5603446" y="685684"/>
-            <a:ext cx="5926079" cy="2344982"/>
+            <a:off x="4787272" y="3298371"/>
+            <a:ext cx="6998590" cy="3253890"/>
           </a:xfrm>
           <a:prstGeom prst="rect">
             <a:avLst/>
@@ -3439,10 +3842,10 @@
       </p:pic>
       <p:pic>
         <p:nvPicPr>
-          <p:cNvPr id="11" name="Picture 10" descr="Chart, bar chart&#10;&#10;Description automatically generated">
-            <a:extLst>
-              <a:ext uri="{FF2B5EF4-FFF2-40B4-BE49-F238E27FC236}">
-                <a16:creationId xmlns:a16="http://schemas.microsoft.com/office/drawing/2014/main" id="{6C2EF534-8B17-2159-83EC-52776A3CEAEE}"/>
+          <p:cNvPr id="13" name="Picture 12" descr="Chart, scatter chart&#10;&#10;Description automatically generated">
+            <a:extLst>
+              <a:ext uri="{FF2B5EF4-FFF2-40B4-BE49-F238E27FC236}">
+                <a16:creationId xmlns:a16="http://schemas.microsoft.com/office/drawing/2014/main" id="{2CA25674-2267-AE07-DBD6-70BA8626D113}"/>
               </a:ext>
             </a:extLst>
           </p:cNvPr>
@@ -3453,6 +3856,42 @@
         </p:nvPicPr>
         <p:blipFill>
           <a:blip r:embed="rId5">
+            <a:extLst>
+              <a:ext uri="{28A0092B-C50C-407E-A947-70E740481C1C}">
+                <a14:useLocalDpi xmlns:a14="http://schemas.microsoft.com/office/drawing/2010/main" val="0"/>
+              </a:ext>
+            </a:extLst>
+          </a:blip>
+          <a:stretch>
+            <a:fillRect/>
+          </a:stretch>
+        </p:blipFill>
+        <p:spPr>
+          <a:xfrm>
+            <a:off x="5603446" y="685684"/>
+            <a:ext cx="5926079" cy="2344982"/>
+          </a:xfrm>
+          <a:prstGeom prst="rect">
+            <a:avLst/>
+          </a:prstGeom>
+        </p:spPr>
+      </p:pic>
+      <p:pic>
+        <p:nvPicPr>
+          <p:cNvPr id="11" name="Picture 10" descr="Chart, bar chart&#10;&#10;Description automatically generated">
+            <a:extLst>
+              <a:ext uri="{FF2B5EF4-FFF2-40B4-BE49-F238E27FC236}">
+                <a16:creationId xmlns:a16="http://schemas.microsoft.com/office/drawing/2014/main" id="{6C2EF534-8B17-2159-83EC-52776A3CEAEE}"/>
+              </a:ext>
+            </a:extLst>
+          </p:cNvPr>
+          <p:cNvPicPr>
+            <a:picLocks noChangeAspect="1"/>
+          </p:cNvPicPr>
+          <p:nvPr/>
+        </p:nvPicPr>
+        <p:blipFill>
+          <a:blip r:embed="rId6">
             <a:extLst>
               <a:ext uri="{28A0092B-C50C-407E-A947-70E740481C1C}">
                 <a14:useLocalDpi xmlns:a14="http://schemas.microsoft.com/office/drawing/2010/main" val="0"/>
@@ -3643,12 +4082,82 @@
           <a:chExt cx="0" cy="0"/>
         </a:xfrm>
       </p:grpSpPr>
+      <p:sp>
+        <p:nvSpPr>
+          <p:cNvPr id="5" name="TextBox 4">
+            <a:extLst>
+              <a:ext uri="{FF2B5EF4-FFF2-40B4-BE49-F238E27FC236}">
+                <a16:creationId xmlns:a16="http://schemas.microsoft.com/office/drawing/2014/main" id="{01D00A8E-0996-6A31-FD02-715A728E4A8F}"/>
+              </a:ext>
+            </a:extLst>
+          </p:cNvPr>
+          <p:cNvSpPr txBox="1"/>
+          <p:nvPr/>
+        </p:nvSpPr>
+        <p:spPr>
+          <a:xfrm>
+            <a:off x="2725094" y="1703920"/>
+            <a:ext cx="317716" cy="369332"/>
+          </a:xfrm>
+          <a:prstGeom prst="rect">
+            <a:avLst/>
+          </a:prstGeom>
+          <a:noFill/>
+        </p:spPr>
+        <p:txBody>
+          <a:bodyPr wrap="none" rtlCol="0">
+            <a:spAutoFit/>
+          </a:bodyPr>
+          <a:lstStyle/>
+          <a:p>
+            <a:r>
+              <a:rPr lang="en-US" dirty="0"/>
+              <a:t>A</a:t>
+            </a:r>
+          </a:p>
+        </p:txBody>
+      </p:sp>
+      <p:sp>
+        <p:nvSpPr>
+          <p:cNvPr id="6" name="TextBox 5">
+            <a:extLst>
+              <a:ext uri="{FF2B5EF4-FFF2-40B4-BE49-F238E27FC236}">
+                <a16:creationId xmlns:a16="http://schemas.microsoft.com/office/drawing/2014/main" id="{1C2FE5E3-1DC9-AE64-CB2A-466F35D069C9}"/>
+              </a:ext>
+            </a:extLst>
+          </p:cNvPr>
+          <p:cNvSpPr txBox="1"/>
+          <p:nvPr/>
+        </p:nvSpPr>
+        <p:spPr>
+          <a:xfrm>
+            <a:off x="6898740" y="1703920"/>
+            <a:ext cx="317716" cy="369332"/>
+          </a:xfrm>
+          <a:prstGeom prst="rect">
+            <a:avLst/>
+          </a:prstGeom>
+          <a:noFill/>
+        </p:spPr>
+        <p:txBody>
+          <a:bodyPr wrap="none" rtlCol="0">
+            <a:spAutoFit/>
+          </a:bodyPr>
+          <a:lstStyle/>
+          <a:p>
+            <a:r>
+              <a:rPr lang="en-US" dirty="0"/>
+              <a:t>B</a:t>
+            </a:r>
+          </a:p>
+        </p:txBody>
+      </p:sp>
       <p:pic>
         <p:nvPicPr>
-          <p:cNvPr id="4" name="Picture 3" descr="Chart&#10;&#10;Description automatically generated with medium confidence">
-            <a:extLst>
-              <a:ext uri="{FF2B5EF4-FFF2-40B4-BE49-F238E27FC236}">
-                <a16:creationId xmlns:a16="http://schemas.microsoft.com/office/drawing/2014/main" id="{9E64FEE7-DAB4-0DC9-536C-1B249594D505}"/>
+          <p:cNvPr id="3" name="Picture 2" descr="Chart&#10;&#10;Description automatically generated with medium confidence">
+            <a:extLst>
+              <a:ext uri="{FF2B5EF4-FFF2-40B4-BE49-F238E27FC236}">
+                <a16:creationId xmlns:a16="http://schemas.microsoft.com/office/drawing/2014/main" id="{C7A2E663-3292-F6BC-9CA0-4346DF883C2F}"/>
               </a:ext>
             </a:extLst>
           </p:cNvPr>
@@ -3671,84 +4180,14 @@
         </p:blipFill>
         <p:spPr>
           <a:xfrm>
-            <a:off x="1469679" y="1215033"/>
-            <a:ext cx="9252642" cy="4780860"/>
+            <a:off x="1771927" y="88685"/>
+            <a:ext cx="7924800" cy="4248150"/>
           </a:xfrm>
           <a:prstGeom prst="rect">
             <a:avLst/>
           </a:prstGeom>
         </p:spPr>
       </p:pic>
-      <p:sp>
-        <p:nvSpPr>
-          <p:cNvPr id="5" name="TextBox 4">
-            <a:extLst>
-              <a:ext uri="{FF2B5EF4-FFF2-40B4-BE49-F238E27FC236}">
-                <a16:creationId xmlns:a16="http://schemas.microsoft.com/office/drawing/2014/main" id="{01D00A8E-0996-6A31-FD02-715A728E4A8F}"/>
-              </a:ext>
-            </a:extLst>
-          </p:cNvPr>
-          <p:cNvSpPr txBox="1"/>
-          <p:nvPr/>
-        </p:nvSpPr>
-        <p:spPr>
-          <a:xfrm>
-            <a:off x="2725094" y="1703920"/>
-            <a:ext cx="317716" cy="369332"/>
-          </a:xfrm>
-          <a:prstGeom prst="rect">
-            <a:avLst/>
-          </a:prstGeom>
-          <a:noFill/>
-        </p:spPr>
-        <p:txBody>
-          <a:bodyPr wrap="none" rtlCol="0">
-            <a:spAutoFit/>
-          </a:bodyPr>
-          <a:lstStyle/>
-          <a:p>
-            <a:r>
-              <a:rPr lang="en-US" dirty="0"/>
-              <a:t>A</a:t>
-            </a:r>
-          </a:p>
-        </p:txBody>
-      </p:sp>
-      <p:sp>
-        <p:nvSpPr>
-          <p:cNvPr id="6" name="TextBox 5">
-            <a:extLst>
-              <a:ext uri="{FF2B5EF4-FFF2-40B4-BE49-F238E27FC236}">
-                <a16:creationId xmlns:a16="http://schemas.microsoft.com/office/drawing/2014/main" id="{1C2FE5E3-1DC9-AE64-CB2A-466F35D069C9}"/>
-              </a:ext>
-            </a:extLst>
-          </p:cNvPr>
-          <p:cNvSpPr txBox="1"/>
-          <p:nvPr/>
-        </p:nvSpPr>
-        <p:spPr>
-          <a:xfrm>
-            <a:off x="6898740" y="1703920"/>
-            <a:ext cx="317716" cy="369332"/>
-          </a:xfrm>
-          <a:prstGeom prst="rect">
-            <a:avLst/>
-          </a:prstGeom>
-          <a:noFill/>
-        </p:spPr>
-        <p:txBody>
-          <a:bodyPr wrap="none" rtlCol="0">
-            <a:spAutoFit/>
-          </a:bodyPr>
-          <a:lstStyle/>
-          <a:p>
-            <a:r>
-              <a:rPr lang="en-US" dirty="0"/>
-              <a:t>B</a:t>
-            </a:r>
-          </a:p>
-        </p:txBody>
-      </p:sp>
     </p:spTree>
     <p:extLst>
       <p:ext uri="{BB962C8B-B14F-4D97-AF65-F5344CB8AC3E}">
@@ -3908,7 +4347,7 @@
             <a:avLst/>
           </a:prstGeom>
           <a:noFill/>
-          <a:ln w="28575">
+          <a:ln w="9525">
             <a:solidFill>
               <a:schemeClr val="tx1"/>
             </a:solidFill>
@@ -3960,7 +4399,7 @@
             <a:avLst/>
           </a:prstGeom>
           <a:noFill/>
-          <a:ln w="28575">
+          <a:ln w="9525">
             <a:solidFill>
               <a:schemeClr val="tx1"/>
             </a:solidFill>
@@ -4012,7 +4451,7 @@
             <a:avLst/>
           </a:prstGeom>
           <a:noFill/>
-          <a:ln w="28575">
+          <a:ln w="9525">
             <a:solidFill>
               <a:schemeClr val="tx1"/>
             </a:solidFill>
@@ -4620,6 +5059,467 @@
     <p:extLst>
       <p:ext uri="{BB962C8B-B14F-4D97-AF65-F5344CB8AC3E}">
         <p14:creationId xmlns:p14="http://schemas.microsoft.com/office/powerpoint/2010/main" val="2974060924"/>
+      </p:ext>
+    </p:extLst>
+  </p:cSld>
+  <p:clrMapOvr>
+    <a:masterClrMapping/>
+  </p:clrMapOvr>
+</p:sld>
+</file>
+
+<file path=ppt/slides/slide5.xml><?xml version="1.0" encoding="utf-8"?>
+<p:sld xmlns:a="http://schemas.openxmlformats.org/drawingml/2006/main" xmlns:r="http://schemas.openxmlformats.org/officeDocument/2006/relationships" xmlns:p="http://schemas.openxmlformats.org/presentationml/2006/main">
+  <p:cSld>
+    <p:spTree>
+      <p:nvGrpSpPr>
+        <p:cNvPr id="1" name=""/>
+        <p:cNvGrpSpPr/>
+        <p:nvPr/>
+      </p:nvGrpSpPr>
+      <p:grpSpPr>
+        <a:xfrm>
+          <a:off x="0" y="0"/>
+          <a:ext cx="0" cy="0"/>
+          <a:chOff x="0" y="0"/>
+          <a:chExt cx="0" cy="0"/>
+        </a:xfrm>
+      </p:grpSpPr>
+      <p:pic>
+        <p:nvPicPr>
+          <p:cNvPr id="5" name="Picture 4" descr="Chart, bar chart, histogram&#10;&#10;Description automatically generated">
+            <a:extLst>
+              <a:ext uri="{FF2B5EF4-FFF2-40B4-BE49-F238E27FC236}">
+                <a16:creationId xmlns:a16="http://schemas.microsoft.com/office/drawing/2014/main" id="{C773D305-95F4-71D1-4CE4-CC638DA76D50}"/>
+              </a:ext>
+            </a:extLst>
+          </p:cNvPr>
+          <p:cNvPicPr>
+            <a:picLocks noChangeAspect="1"/>
+          </p:cNvPicPr>
+          <p:nvPr/>
+        </p:nvPicPr>
+        <p:blipFill>
+          <a:blip r:embed="rId2">
+            <a:extLst>
+              <a:ext uri="{28A0092B-C50C-407E-A947-70E740481C1C}">
+                <a14:useLocalDpi xmlns:a14="http://schemas.microsoft.com/office/drawing/2010/main" val="0"/>
+              </a:ext>
+            </a:extLst>
+          </a:blip>
+          <a:stretch>
+            <a:fillRect/>
+          </a:stretch>
+        </p:blipFill>
+        <p:spPr>
+          <a:xfrm>
+            <a:off x="850583" y="2046814"/>
+            <a:ext cx="5926602" cy="2639487"/>
+          </a:xfrm>
+          <a:prstGeom prst="rect">
+            <a:avLst/>
+          </a:prstGeom>
+        </p:spPr>
+      </p:pic>
+      <p:pic>
+        <p:nvPicPr>
+          <p:cNvPr id="7" name="Picture 6" descr="Chart, bar chart, histogram&#10;&#10;Description automatically generated">
+            <a:extLst>
+              <a:ext uri="{FF2B5EF4-FFF2-40B4-BE49-F238E27FC236}">
+                <a16:creationId xmlns:a16="http://schemas.microsoft.com/office/drawing/2014/main" id="{4F894B3F-70A8-05AC-04FF-8E88D53B6CC9}"/>
+              </a:ext>
+            </a:extLst>
+          </p:cNvPr>
+          <p:cNvPicPr>
+            <a:picLocks noChangeAspect="1"/>
+          </p:cNvPicPr>
+          <p:nvPr/>
+        </p:nvPicPr>
+        <p:blipFill rotWithShape="1">
+          <a:blip r:embed="rId3">
+            <a:extLst>
+              <a:ext uri="{28A0092B-C50C-407E-A947-70E740481C1C}">
+                <a14:useLocalDpi xmlns:a14="http://schemas.microsoft.com/office/drawing/2010/main" val="0"/>
+              </a:ext>
+            </a:extLst>
+          </a:blip>
+          <a:srcRect r="8392"/>
+          <a:stretch/>
+        </p:blipFill>
+        <p:spPr>
+          <a:xfrm>
+            <a:off x="909961" y="232750"/>
+            <a:ext cx="5343702" cy="1762233"/>
+          </a:xfrm>
+          <a:prstGeom prst="rect">
+            <a:avLst/>
+          </a:prstGeom>
+        </p:spPr>
+      </p:pic>
+      <p:sp>
+        <p:nvSpPr>
+          <p:cNvPr id="10" name="TextBox 9">
+            <a:extLst>
+              <a:ext uri="{FF2B5EF4-FFF2-40B4-BE49-F238E27FC236}">
+                <a16:creationId xmlns:a16="http://schemas.microsoft.com/office/drawing/2014/main" id="{FB112801-9CA8-1F09-B09D-EA1DA96B4DBA}"/>
+              </a:ext>
+            </a:extLst>
+          </p:cNvPr>
+          <p:cNvSpPr txBox="1"/>
+          <p:nvPr/>
+        </p:nvSpPr>
+        <p:spPr>
+          <a:xfrm>
+            <a:off x="740684" y="0"/>
+            <a:ext cx="324128" cy="369332"/>
+          </a:xfrm>
+          <a:prstGeom prst="rect">
+            <a:avLst/>
+          </a:prstGeom>
+          <a:noFill/>
+        </p:spPr>
+        <p:txBody>
+          <a:bodyPr wrap="none" rtlCol="0">
+            <a:spAutoFit/>
+          </a:bodyPr>
+          <a:lstStyle/>
+          <a:p>
+            <a:r>
+              <a:rPr lang="en-US" b="1" dirty="0"/>
+              <a:t>A</a:t>
+            </a:r>
+          </a:p>
+        </p:txBody>
+      </p:sp>
+      <p:sp>
+        <p:nvSpPr>
+          <p:cNvPr id="11" name="TextBox 10">
+            <a:extLst>
+              <a:ext uri="{FF2B5EF4-FFF2-40B4-BE49-F238E27FC236}">
+                <a16:creationId xmlns:a16="http://schemas.microsoft.com/office/drawing/2014/main" id="{4C67005A-0C7A-C64C-6BFE-1F8DA4F90B09}"/>
+              </a:ext>
+            </a:extLst>
+          </p:cNvPr>
+          <p:cNvSpPr txBox="1"/>
+          <p:nvPr/>
+        </p:nvSpPr>
+        <p:spPr>
+          <a:xfrm>
+            <a:off x="747897" y="2678282"/>
+            <a:ext cx="324128" cy="369332"/>
+          </a:xfrm>
+          <a:prstGeom prst="rect">
+            <a:avLst/>
+          </a:prstGeom>
+          <a:noFill/>
+        </p:spPr>
+        <p:txBody>
+          <a:bodyPr wrap="none" rtlCol="0">
+            <a:spAutoFit/>
+          </a:bodyPr>
+          <a:lstStyle/>
+          <a:p>
+            <a:r>
+              <a:rPr lang="en-US" b="1" dirty="0"/>
+              <a:t>B</a:t>
+            </a:r>
+          </a:p>
+        </p:txBody>
+      </p:sp>
+    </p:spTree>
+    <p:extLst>
+      <p:ext uri="{BB962C8B-B14F-4D97-AF65-F5344CB8AC3E}">
+        <p14:creationId xmlns:p14="http://schemas.microsoft.com/office/powerpoint/2010/main" val="2923458795"/>
+      </p:ext>
+    </p:extLst>
+  </p:cSld>
+  <p:clrMapOvr>
+    <a:masterClrMapping/>
+  </p:clrMapOvr>
+</p:sld>
+</file>
+
+<file path=ppt/slides/slide6.xml><?xml version="1.0" encoding="utf-8"?>
+<p:sld xmlns:a="http://schemas.openxmlformats.org/drawingml/2006/main" xmlns:r="http://schemas.openxmlformats.org/officeDocument/2006/relationships" xmlns:p="http://schemas.openxmlformats.org/presentationml/2006/main">
+  <p:cSld>
+    <p:spTree>
+      <p:nvGrpSpPr>
+        <p:cNvPr id="1" name=""/>
+        <p:cNvGrpSpPr/>
+        <p:nvPr/>
+      </p:nvGrpSpPr>
+      <p:grpSpPr>
+        <a:xfrm>
+          <a:off x="0" y="0"/>
+          <a:ext cx="0" cy="0"/>
+          <a:chOff x="0" y="0"/>
+          <a:chExt cx="0" cy="0"/>
+        </a:xfrm>
+      </p:grpSpPr>
+      <p:pic>
+        <p:nvPicPr>
+          <p:cNvPr id="5" name="Picture 4">
+            <a:extLst>
+              <a:ext uri="{FF2B5EF4-FFF2-40B4-BE49-F238E27FC236}">
+                <a16:creationId xmlns:a16="http://schemas.microsoft.com/office/drawing/2014/main" id="{5C4A9B01-ACE4-F16E-93AB-B05AEBE76425}"/>
+              </a:ext>
+            </a:extLst>
+          </p:cNvPr>
+          <p:cNvPicPr>
+            <a:picLocks noChangeAspect="1"/>
+          </p:cNvPicPr>
+          <p:nvPr/>
+        </p:nvPicPr>
+        <p:blipFill>
+          <a:blip r:embed="rId2"/>
+          <a:stretch>
+            <a:fillRect/>
+          </a:stretch>
+        </p:blipFill>
+        <p:spPr>
+          <a:xfrm>
+            <a:off x="920750" y="508402"/>
+            <a:ext cx="7451324" cy="4138995"/>
+          </a:xfrm>
+          <a:prstGeom prst="rect">
+            <a:avLst/>
+          </a:prstGeom>
+        </p:spPr>
+      </p:pic>
+      <p:sp>
+        <p:nvSpPr>
+          <p:cNvPr id="6" name="TextBox 5">
+            <a:extLst>
+              <a:ext uri="{FF2B5EF4-FFF2-40B4-BE49-F238E27FC236}">
+                <a16:creationId xmlns:a16="http://schemas.microsoft.com/office/drawing/2014/main" id="{E787C449-2F5D-2900-007A-37CCE4AFFEF8}"/>
+              </a:ext>
+            </a:extLst>
+          </p:cNvPr>
+          <p:cNvSpPr txBox="1"/>
+          <p:nvPr/>
+        </p:nvSpPr>
+        <p:spPr>
+          <a:xfrm>
+            <a:off x="920750" y="711200"/>
+            <a:ext cx="348172" cy="461665"/>
+          </a:xfrm>
+          <a:prstGeom prst="rect">
+            <a:avLst/>
+          </a:prstGeom>
+          <a:noFill/>
+        </p:spPr>
+        <p:txBody>
+          <a:bodyPr wrap="none" rtlCol="0">
+            <a:spAutoFit/>
+          </a:bodyPr>
+          <a:lstStyle/>
+          <a:p>
+            <a:r>
+              <a:rPr lang="en-US" sz="2400" b="1" dirty="0"/>
+              <a:t>C</a:t>
+            </a:r>
+          </a:p>
+        </p:txBody>
+      </p:sp>
+      <p:sp>
+        <p:nvSpPr>
+          <p:cNvPr id="3" name="Rectangle 2">
+            <a:extLst>
+              <a:ext uri="{FF2B5EF4-FFF2-40B4-BE49-F238E27FC236}">
+                <a16:creationId xmlns:a16="http://schemas.microsoft.com/office/drawing/2014/main" id="{597A9E18-7E01-8D58-E4EB-8DF3072FA2D3}"/>
+              </a:ext>
+            </a:extLst>
+          </p:cNvPr>
+          <p:cNvSpPr/>
+          <p:nvPr/>
+        </p:nvSpPr>
+        <p:spPr>
+          <a:xfrm>
+            <a:off x="6381750" y="4470400"/>
+            <a:ext cx="1066800" cy="266700"/>
+          </a:xfrm>
+          <a:prstGeom prst="rect">
+            <a:avLst/>
+          </a:prstGeom>
+          <a:solidFill>
+            <a:schemeClr val="bg1"/>
+          </a:solidFill>
+          <a:ln>
+            <a:solidFill>
+              <a:schemeClr val="bg1"/>
+            </a:solidFill>
+          </a:ln>
+        </p:spPr>
+        <p:style>
+          <a:lnRef idx="2">
+            <a:schemeClr val="accent1">
+              <a:shade val="50000"/>
+            </a:schemeClr>
+          </a:lnRef>
+          <a:fillRef idx="1">
+            <a:schemeClr val="accent1"/>
+          </a:fillRef>
+          <a:effectRef idx="0">
+            <a:schemeClr val="accent1"/>
+          </a:effectRef>
+          <a:fontRef idx="minor">
+            <a:schemeClr val="lt1"/>
+          </a:fontRef>
+        </p:style>
+        <p:txBody>
+          <a:bodyPr rtlCol="0" anchor="ctr"/>
+          <a:lstStyle/>
+          <a:p>
+            <a:pPr algn="ctr"/>
+            <a:endParaRPr lang="en-US"/>
+          </a:p>
+        </p:txBody>
+      </p:sp>
+      <p:sp>
+        <p:nvSpPr>
+          <p:cNvPr id="2" name="TextBox 1">
+            <a:extLst>
+              <a:ext uri="{FF2B5EF4-FFF2-40B4-BE49-F238E27FC236}">
+                <a16:creationId xmlns:a16="http://schemas.microsoft.com/office/drawing/2014/main" id="{8DC9710D-4180-D038-499E-BC32EE3BE5ED}"/>
+              </a:ext>
+            </a:extLst>
+          </p:cNvPr>
+          <p:cNvSpPr txBox="1"/>
+          <p:nvPr/>
+        </p:nvSpPr>
+        <p:spPr>
+          <a:xfrm>
+            <a:off x="6442223" y="4401176"/>
+            <a:ext cx="1085554" cy="246221"/>
+          </a:xfrm>
+          <a:prstGeom prst="rect">
+            <a:avLst/>
+          </a:prstGeom>
+          <a:noFill/>
+        </p:spPr>
+        <p:txBody>
+          <a:bodyPr wrap="none" rtlCol="0">
+            <a:spAutoFit/>
+          </a:bodyPr>
+          <a:lstStyle/>
+          <a:p>
+            <a:r>
+              <a:rPr lang="en-US" sz="1000" b="1" dirty="0"/>
+              <a:t>m/z (numbering)</a:t>
+            </a:r>
+          </a:p>
+        </p:txBody>
+      </p:sp>
+    </p:spTree>
+    <p:extLst>
+      <p:ext uri="{BB962C8B-B14F-4D97-AF65-F5344CB8AC3E}">
+        <p14:creationId xmlns:p14="http://schemas.microsoft.com/office/powerpoint/2010/main" val="2761347050"/>
+      </p:ext>
+    </p:extLst>
+  </p:cSld>
+  <p:clrMapOvr>
+    <a:masterClrMapping/>
+  </p:clrMapOvr>
+</p:sld>
+</file>
+
+<file path=ppt/slides/slide7.xml><?xml version="1.0" encoding="utf-8"?>
+<p:sld xmlns:a="http://schemas.openxmlformats.org/drawingml/2006/main" xmlns:r="http://schemas.openxmlformats.org/officeDocument/2006/relationships" xmlns:p="http://schemas.openxmlformats.org/presentationml/2006/main">
+  <p:cSld>
+    <p:spTree>
+      <p:nvGrpSpPr>
+        <p:cNvPr id="1" name=""/>
+        <p:cNvGrpSpPr/>
+        <p:nvPr/>
+      </p:nvGrpSpPr>
+      <p:grpSpPr>
+        <a:xfrm>
+          <a:off x="0" y="0"/>
+          <a:ext cx="0" cy="0"/>
+          <a:chOff x="0" y="0"/>
+          <a:chExt cx="0" cy="0"/>
+        </a:xfrm>
+      </p:grpSpPr>
+      <p:pic>
+        <p:nvPicPr>
+          <p:cNvPr id="5" name="Picture 4" descr="Chart&#10;&#10;Description automatically generated">
+            <a:extLst>
+              <a:ext uri="{FF2B5EF4-FFF2-40B4-BE49-F238E27FC236}">
+                <a16:creationId xmlns:a16="http://schemas.microsoft.com/office/drawing/2014/main" id="{FFB1448B-0C6F-1F8E-D2D3-39F2E7DF4448}"/>
+              </a:ext>
+            </a:extLst>
+          </p:cNvPr>
+          <p:cNvPicPr>
+            <a:picLocks noChangeAspect="1"/>
+          </p:cNvPicPr>
+          <p:nvPr/>
+        </p:nvPicPr>
+        <p:blipFill>
+          <a:blip r:embed="rId2">
+            <a:extLst>
+              <a:ext uri="{28A0092B-C50C-407E-A947-70E740481C1C}">
+                <a14:useLocalDpi xmlns:a14="http://schemas.microsoft.com/office/drawing/2010/main" val="0"/>
+              </a:ext>
+            </a:extLst>
+          </a:blip>
+          <a:stretch>
+            <a:fillRect/>
+          </a:stretch>
+        </p:blipFill>
+        <p:spPr>
+          <a:xfrm>
+            <a:off x="1719262" y="2171700"/>
+            <a:ext cx="8753475" cy="2514600"/>
+          </a:xfrm>
+          <a:prstGeom prst="rect">
+            <a:avLst/>
+          </a:prstGeom>
+          <a:ln>
+            <a:solidFill>
+              <a:schemeClr val="tx1"/>
+            </a:solidFill>
+          </a:ln>
+        </p:spPr>
+      </p:pic>
+      <p:sp>
+        <p:nvSpPr>
+          <p:cNvPr id="6" name="TextBox 5">
+            <a:extLst>
+              <a:ext uri="{FF2B5EF4-FFF2-40B4-BE49-F238E27FC236}">
+                <a16:creationId xmlns:a16="http://schemas.microsoft.com/office/drawing/2014/main" id="{746C5826-F2FC-F3B1-F4DD-24F3121CB59B}"/>
+              </a:ext>
+            </a:extLst>
+          </p:cNvPr>
+          <p:cNvSpPr txBox="1"/>
+          <p:nvPr/>
+        </p:nvSpPr>
+        <p:spPr>
+          <a:xfrm>
+            <a:off x="1719262" y="2114550"/>
+            <a:ext cx="330540" cy="369332"/>
+          </a:xfrm>
+          <a:prstGeom prst="rect">
+            <a:avLst/>
+          </a:prstGeom>
+          <a:noFill/>
+        </p:spPr>
+        <p:txBody>
+          <a:bodyPr wrap="none" rtlCol="0">
+            <a:spAutoFit/>
+          </a:bodyPr>
+          <a:lstStyle/>
+          <a:p>
+            <a:r>
+              <a:rPr lang="en-US" b="1" dirty="0"/>
+              <a:t>D</a:t>
+            </a:r>
+          </a:p>
+        </p:txBody>
+      </p:sp>
+    </p:spTree>
+    <p:extLst>
+      <p:ext uri="{BB962C8B-B14F-4D97-AF65-F5344CB8AC3E}">
+        <p14:creationId xmlns:p14="http://schemas.microsoft.com/office/powerpoint/2010/main" val="194780237"/>
       </p:ext>
     </p:extLst>
   </p:cSld>
@@ -4922,4 +5822,299 @@
     </a:ext>
   </a:extLst>
 </a:theme>
+</file>
+
+<file path=ppt/theme/theme2.xml><?xml version="1.0" encoding="utf-8"?>
+<a:theme xmlns:a="http://schemas.openxmlformats.org/drawingml/2006/main" name="Office Theme">
+  <a:themeElements>
+    <a:clrScheme name="Office">
+      <a:dk1>
+        <a:sysClr val="windowText" lastClr="000000"/>
+      </a:dk1>
+      <a:lt1>
+        <a:sysClr val="window" lastClr="FFFFFF"/>
+      </a:lt1>
+      <a:dk2>
+        <a:srgbClr val="44546A"/>
+      </a:dk2>
+      <a:lt2>
+        <a:srgbClr val="E7E6E6"/>
+      </a:lt2>
+      <a:accent1>
+        <a:srgbClr val="4472C4"/>
+      </a:accent1>
+      <a:accent2>
+        <a:srgbClr val="ED7D31"/>
+      </a:accent2>
+      <a:accent3>
+        <a:srgbClr val="A5A5A5"/>
+      </a:accent3>
+      <a:accent4>
+        <a:srgbClr val="FFC000"/>
+      </a:accent4>
+      <a:accent5>
+        <a:srgbClr val="5B9BD5"/>
+      </a:accent5>
+      <a:accent6>
+        <a:srgbClr val="70AD47"/>
+      </a:accent6>
+      <a:hlink>
+        <a:srgbClr val="0563C1"/>
+      </a:hlink>
+      <a:folHlink>
+        <a:srgbClr val="954F72"/>
+      </a:folHlink>
+    </a:clrScheme>
+    <a:fontScheme name="Office">
+      <a:majorFont>
+        <a:latin typeface="Calibri Light" panose="020F0302020204030204"/>
+        <a:ea typeface=""/>
+        <a:cs typeface=""/>
+        <a:font script="Jpan" typeface="游ゴシック Light"/>
+        <a:font script="Hang" typeface="맑은 고딕"/>
+        <a:font script="Hans" typeface="等线 Light"/>
+        <a:font script="Hant" typeface="新細明體"/>
+        <a:font script="Arab" typeface="Times New Roman"/>
+        <a:font script="Hebr" typeface="Times New Roman"/>
+        <a:font script="Thai" typeface="Angsana New"/>
+        <a:font script="Ethi" typeface="Nyala"/>
+        <a:font script="Beng" typeface="Vrinda"/>
+        <a:font script="Gujr" typeface="Shruti"/>
+        <a:font script="Khmr" typeface="MoolBoran"/>
+        <a:font script="Knda" typeface="Tunga"/>
+        <a:font script="Guru" typeface="Raavi"/>
+        <a:font script="Cans" typeface="Euphemia"/>
+        <a:font script="Cher" typeface="Plantagenet Cherokee"/>
+        <a:font script="Yiii" typeface="Microsoft Yi Baiti"/>
+        <a:font script="Tibt" typeface="Microsoft Himalaya"/>
+        <a:font script="Thaa" typeface="MV Boli"/>
+        <a:font script="Deva" typeface="Mangal"/>
+        <a:font script="Telu" typeface="Gautami"/>
+        <a:font script="Taml" typeface="Latha"/>
+        <a:font script="Syrc" typeface="Estrangelo Edessa"/>
+        <a:font script="Orya" typeface="Kalinga"/>
+        <a:font script="Mlym" typeface="Kartika"/>
+        <a:font script="Laoo" typeface="DokChampa"/>
+        <a:font script="Sinh" typeface="Iskoola Pota"/>
+        <a:font script="Mong" typeface="Mongolian Baiti"/>
+        <a:font script="Viet" typeface="Times New Roman"/>
+        <a:font script="Uigh" typeface="Microsoft Uighur"/>
+        <a:font script="Geor" typeface="Sylfaen"/>
+        <a:font script="Armn" typeface="Arial"/>
+        <a:font script="Bugi" typeface="Leelawadee UI"/>
+        <a:font script="Bopo" typeface="Microsoft JhengHei"/>
+        <a:font script="Java" typeface="Javanese Text"/>
+        <a:font script="Lisu" typeface="Segoe UI"/>
+        <a:font script="Mymr" typeface="Myanmar Text"/>
+        <a:font script="Nkoo" typeface="Ebrima"/>
+        <a:font script="Olck" typeface="Nirmala UI"/>
+        <a:font script="Osma" typeface="Ebrima"/>
+        <a:font script="Phag" typeface="Phagspa"/>
+        <a:font script="Syrn" typeface="Estrangelo Edessa"/>
+        <a:font script="Syrj" typeface="Estrangelo Edessa"/>
+        <a:font script="Syre" typeface="Estrangelo Edessa"/>
+        <a:font script="Sora" typeface="Nirmala UI"/>
+        <a:font script="Tale" typeface="Microsoft Tai Le"/>
+        <a:font script="Talu" typeface="Microsoft New Tai Lue"/>
+        <a:font script="Tfng" typeface="Ebrima"/>
+      </a:majorFont>
+      <a:minorFont>
+        <a:latin typeface="Calibri" panose="020F0502020204030204"/>
+        <a:ea typeface=""/>
+        <a:cs typeface=""/>
+        <a:font script="Jpan" typeface="游ゴシック"/>
+        <a:font script="Hang" typeface="맑은 고딕"/>
+        <a:font script="Hans" typeface="等线"/>
+        <a:font script="Hant" typeface="新細明體"/>
+        <a:font script="Arab" typeface="Arial"/>
+        <a:font script="Hebr" typeface="Arial"/>
+        <a:font script="Thai" typeface="Cordia New"/>
+        <a:font script="Ethi" typeface="Nyala"/>
+        <a:font script="Beng" typeface="Vrinda"/>
+        <a:font script="Gujr" typeface="Shruti"/>
+        <a:font script="Khmr" typeface="DaunPenh"/>
+        <a:font script="Knda" typeface="Tunga"/>
+        <a:font script="Guru" typeface="Raavi"/>
+        <a:font script="Cans" typeface="Euphemia"/>
+        <a:font script="Cher" typeface="Plantagenet Cherokee"/>
+        <a:font script="Yiii" typeface="Microsoft Yi Baiti"/>
+        <a:font script="Tibt" typeface="Microsoft Himalaya"/>
+        <a:font script="Thaa" typeface="MV Boli"/>
+        <a:font script="Deva" typeface="Mangal"/>
+        <a:font script="Telu" typeface="Gautami"/>
+        <a:font script="Taml" typeface="Latha"/>
+        <a:font script="Syrc" typeface="Estrangelo Edessa"/>
+        <a:font script="Orya" typeface="Kalinga"/>
+        <a:font script="Mlym" typeface="Kartika"/>
+        <a:font script="Laoo" typeface="DokChampa"/>
+        <a:font script="Sinh" typeface="Iskoola Pota"/>
+        <a:font script="Mong" typeface="Mongolian Baiti"/>
+        <a:font script="Viet" typeface="Arial"/>
+        <a:font script="Uigh" typeface="Microsoft Uighur"/>
+        <a:font script="Geor" typeface="Sylfaen"/>
+        <a:font script="Armn" typeface="Arial"/>
+        <a:font script="Bugi" typeface="Leelawadee UI"/>
+        <a:font script="Bopo" typeface="Microsoft JhengHei"/>
+        <a:font script="Java" typeface="Javanese Text"/>
+        <a:font script="Lisu" typeface="Segoe UI"/>
+        <a:font script="Mymr" typeface="Myanmar Text"/>
+        <a:font script="Nkoo" typeface="Ebrima"/>
+        <a:font script="Olck" typeface="Nirmala UI"/>
+        <a:font script="Osma" typeface="Ebrima"/>
+        <a:font script="Phag" typeface="Phagspa"/>
+        <a:font script="Syrn" typeface="Estrangelo Edessa"/>
+        <a:font script="Syrj" typeface="Estrangelo Edessa"/>
+        <a:font script="Syre" typeface="Estrangelo Edessa"/>
+        <a:font script="Sora" typeface="Nirmala UI"/>
+        <a:font script="Tale" typeface="Microsoft Tai Le"/>
+        <a:font script="Talu" typeface="Microsoft New Tai Lue"/>
+        <a:font script="Tfng" typeface="Ebrima"/>
+      </a:minorFont>
+    </a:fontScheme>
+    <a:fmtScheme name="Office">
+      <a:fillStyleLst>
+        <a:solidFill>
+          <a:schemeClr val="phClr"/>
+        </a:solidFill>
+        <a:gradFill rotWithShape="1">
+          <a:gsLst>
+            <a:gs pos="0">
+              <a:schemeClr val="phClr">
+                <a:lumMod val="110000"/>
+                <a:satMod val="105000"/>
+                <a:tint val="67000"/>
+              </a:schemeClr>
+            </a:gs>
+            <a:gs pos="50000">
+              <a:schemeClr val="phClr">
+                <a:lumMod val="105000"/>
+                <a:satMod val="103000"/>
+                <a:tint val="73000"/>
+              </a:schemeClr>
+            </a:gs>
+            <a:gs pos="100000">
+              <a:schemeClr val="phClr">
+                <a:lumMod val="105000"/>
+                <a:satMod val="109000"/>
+                <a:tint val="81000"/>
+              </a:schemeClr>
+            </a:gs>
+          </a:gsLst>
+          <a:lin ang="5400000" scaled="0"/>
+        </a:gradFill>
+        <a:gradFill rotWithShape="1">
+          <a:gsLst>
+            <a:gs pos="0">
+              <a:schemeClr val="phClr">
+                <a:satMod val="103000"/>
+                <a:lumMod val="102000"/>
+                <a:tint val="94000"/>
+              </a:schemeClr>
+            </a:gs>
+            <a:gs pos="50000">
+              <a:schemeClr val="phClr">
+                <a:satMod val="110000"/>
+                <a:lumMod val="100000"/>
+                <a:shade val="100000"/>
+              </a:schemeClr>
+            </a:gs>
+            <a:gs pos="100000">
+              <a:schemeClr val="phClr">
+                <a:lumMod val="99000"/>
+                <a:satMod val="120000"/>
+                <a:shade val="78000"/>
+              </a:schemeClr>
+            </a:gs>
+          </a:gsLst>
+          <a:lin ang="5400000" scaled="0"/>
+        </a:gradFill>
+      </a:fillStyleLst>
+      <a:lnStyleLst>
+        <a:ln w="6350" cap="flat" cmpd="sng" algn="ctr">
+          <a:solidFill>
+            <a:schemeClr val="phClr"/>
+          </a:solidFill>
+          <a:prstDash val="solid"/>
+          <a:miter lim="800000"/>
+        </a:ln>
+        <a:ln w="12700" cap="flat" cmpd="sng" algn="ctr">
+          <a:solidFill>
+            <a:schemeClr val="phClr"/>
+          </a:solidFill>
+          <a:prstDash val="solid"/>
+          <a:miter lim="800000"/>
+        </a:ln>
+        <a:ln w="19050" cap="flat" cmpd="sng" algn="ctr">
+          <a:solidFill>
+            <a:schemeClr val="phClr"/>
+          </a:solidFill>
+          <a:prstDash val="solid"/>
+          <a:miter lim="800000"/>
+        </a:ln>
+      </a:lnStyleLst>
+      <a:effectStyleLst>
+        <a:effectStyle>
+          <a:effectLst/>
+        </a:effectStyle>
+        <a:effectStyle>
+          <a:effectLst/>
+        </a:effectStyle>
+        <a:effectStyle>
+          <a:effectLst>
+            <a:outerShdw blurRad="57150" dist="19050" dir="5400000" algn="ctr" rotWithShape="0">
+              <a:srgbClr val="000000">
+                <a:alpha val="63000"/>
+              </a:srgbClr>
+            </a:outerShdw>
+          </a:effectLst>
+        </a:effectStyle>
+      </a:effectStyleLst>
+      <a:bgFillStyleLst>
+        <a:solidFill>
+          <a:schemeClr val="phClr"/>
+        </a:solidFill>
+        <a:solidFill>
+          <a:schemeClr val="phClr">
+            <a:tint val="95000"/>
+            <a:satMod val="170000"/>
+          </a:schemeClr>
+        </a:solidFill>
+        <a:gradFill rotWithShape="1">
+          <a:gsLst>
+            <a:gs pos="0">
+              <a:schemeClr val="phClr">
+                <a:tint val="93000"/>
+                <a:satMod val="150000"/>
+                <a:shade val="98000"/>
+                <a:lumMod val="102000"/>
+              </a:schemeClr>
+            </a:gs>
+            <a:gs pos="50000">
+              <a:schemeClr val="phClr">
+                <a:tint val="98000"/>
+                <a:satMod val="130000"/>
+                <a:shade val="90000"/>
+                <a:lumMod val="103000"/>
+              </a:schemeClr>
+            </a:gs>
+            <a:gs pos="100000">
+              <a:schemeClr val="phClr">
+                <a:shade val="63000"/>
+                <a:satMod val="120000"/>
+              </a:schemeClr>
+            </a:gs>
+          </a:gsLst>
+          <a:lin ang="5400000" scaled="0"/>
+        </a:gradFill>
+      </a:bgFillStyleLst>
+    </a:fmtScheme>
+  </a:themeElements>
+  <a:objectDefaults/>
+  <a:extraClrSchemeLst/>
+  <a:extLst>
+    <a:ext uri="{05A4C25C-085E-4340-85A3-A5531E510DB2}">
+      <thm15:themeFamily xmlns:thm15="http://schemas.microsoft.com/office/thememl/2012/main" name="Office Theme" id="{62F939B6-93AF-4DB8-9C6B-D6C7DFDC589F}" vid="{4A3C46E8-61CC-4603-A589-7422A47A8E4A}"/>
+    </a:ext>
+  </a:extLst>
+</a:theme>
 </file>
</xml_diff>